<commit_message>
updated docs and files
</commit_message>
<xml_diff>
--- a/docs/Copy of Mini Project 1-2.pptx
+++ b/docs/Copy of Mini Project 1-2.pptx
@@ -5,7 +5,7 @@
     <p:sldMasterId id="2147483659" r:id="rId1"/>
   </p:sldMasterIdLst>
   <p:notesMasterIdLst>
-    <p:notesMasterId r:id="rId13"/>
+    <p:notesMasterId r:id="rId12"/>
   </p:notesMasterIdLst>
   <p:sldIdLst>
     <p:sldId id="256" r:id="rId2"/>
@@ -16,33 +16,32 @@
     <p:sldId id="261" r:id="rId7"/>
     <p:sldId id="262" r:id="rId8"/>
     <p:sldId id="263" r:id="rId9"/>
-    <p:sldId id="264" r:id="rId10"/>
-    <p:sldId id="265" r:id="rId11"/>
-    <p:sldId id="266" r:id="rId12"/>
+    <p:sldId id="265" r:id="rId10"/>
+    <p:sldId id="266" r:id="rId11"/>
   </p:sldIdLst>
   <p:sldSz cx="9144000" cy="5143500" type="screen16x9"/>
   <p:notesSz cx="6858000" cy="9144000"/>
   <p:embeddedFontLst>
     <p:embeddedFont>
       <p:font typeface="Georgia" panose="02040502050405020303" pitchFamily="18" charset="0"/>
-      <p:regular r:id="rId14"/>
-      <p:bold r:id="rId15"/>
-      <p:italic r:id="rId16"/>
-      <p:boldItalic r:id="rId17"/>
+      <p:regular r:id="rId13"/>
+      <p:bold r:id="rId14"/>
+      <p:italic r:id="rId15"/>
+      <p:boldItalic r:id="rId16"/>
     </p:embeddedFont>
     <p:embeddedFont>
       <p:font typeface="Lato" panose="020F0502020204030203" pitchFamily="34" charset="77"/>
-      <p:regular r:id="rId18"/>
-      <p:bold r:id="rId19"/>
-      <p:italic r:id="rId20"/>
-      <p:boldItalic r:id="rId21"/>
+      <p:regular r:id="rId17"/>
+      <p:bold r:id="rId18"/>
+      <p:italic r:id="rId19"/>
+      <p:boldItalic r:id="rId20"/>
     </p:embeddedFont>
     <p:embeddedFont>
       <p:font typeface="Montserrat" pitchFamily="2" charset="77"/>
-      <p:regular r:id="rId22"/>
-      <p:bold r:id="rId23"/>
-      <p:italic r:id="rId24"/>
-      <p:boldItalic r:id="rId25"/>
+      <p:regular r:id="rId21"/>
+      <p:bold r:id="rId22"/>
+      <p:italic r:id="rId23"/>
+      <p:boldItalic r:id="rId24"/>
     </p:embeddedFont>
   </p:embeddedFontLst>
   <p:defaultTextStyle>
@@ -847,110 +846,6 @@
   <p:cSld>
     <p:spTree>
       <p:nvGrpSpPr>
-        <p:cNvPr id="1" name="Shape 183"/>
-        <p:cNvGrpSpPr/>
-        <p:nvPr/>
-      </p:nvGrpSpPr>
-      <p:grpSpPr>
-        <a:xfrm>
-          <a:off x="0" y="0"/>
-          <a:ext cx="0" cy="0"/>
-          <a:chOff x="0" y="0"/>
-          <a:chExt cx="0" cy="0"/>
-        </a:xfrm>
-      </p:grpSpPr>
-      <p:sp>
-        <p:nvSpPr>
-          <p:cNvPr id="184" name="Google Shape;184;gd6493ab6d3_0_32:notes"/>
-          <p:cNvSpPr>
-            <a:spLocks noGrp="1" noRot="1" noChangeAspect="1"/>
-          </p:cNvSpPr>
-          <p:nvPr>
-            <p:ph type="sldImg" idx="2"/>
-          </p:nvPr>
-        </p:nvSpPr>
-        <p:spPr>
-          <a:xfrm>
-            <a:off x="381000" y="685800"/>
-            <a:ext cx="6096000" cy="3429000"/>
-          </a:xfrm>
-          <a:custGeom>
-            <a:avLst/>
-            <a:gdLst/>
-            <a:ahLst/>
-            <a:cxnLst/>
-            <a:rect l="l" t="t" r="r" b="b"/>
-            <a:pathLst>
-              <a:path w="120000" h="120000" extrusionOk="0">
-                <a:moveTo>
-                  <a:pt x="0" y="0"/>
-                </a:moveTo>
-                <a:lnTo>
-                  <a:pt x="120000" y="0"/>
-                </a:lnTo>
-                <a:lnTo>
-                  <a:pt x="120000" y="120000"/>
-                </a:lnTo>
-                <a:lnTo>
-                  <a:pt x="0" y="120000"/>
-                </a:lnTo>
-                <a:close/>
-              </a:path>
-            </a:pathLst>
-          </a:custGeom>
-        </p:spPr>
-      </p:sp>
-      <p:sp>
-        <p:nvSpPr>
-          <p:cNvPr id="185" name="Google Shape;185;gd6493ab6d3_0_32:notes"/>
-          <p:cNvSpPr txBox="1">
-            <a:spLocks noGrp="1"/>
-          </p:cNvSpPr>
-          <p:nvPr>
-            <p:ph type="body" idx="1"/>
-          </p:nvPr>
-        </p:nvSpPr>
-        <p:spPr>
-          <a:xfrm>
-            <a:off x="685800" y="4343400"/>
-            <a:ext cx="5486400" cy="4114800"/>
-          </a:xfrm>
-          <a:prstGeom prst="rect">
-            <a:avLst/>
-          </a:prstGeom>
-        </p:spPr>
-        <p:txBody>
-          <a:bodyPr spcFirstLastPara="1" wrap="square" lIns="91425" tIns="91425" rIns="91425" bIns="91425" anchor="t" anchorCtr="0">
-            <a:noAutofit/>
-          </a:bodyPr>
-          <a:lstStyle/>
-          <a:p>
-            <a:pPr marL="0" lvl="0" indent="0" algn="l" rtl="0">
-              <a:spcBef>
-                <a:spcPts val="0"/>
-              </a:spcBef>
-              <a:spcAft>
-                <a:spcPts val="0"/>
-              </a:spcAft>
-              <a:buNone/>
-            </a:pPr>
-            <a:endParaRPr/>
-          </a:p>
-        </p:txBody>
-      </p:sp>
-    </p:spTree>
-  </p:cSld>
-  <p:clrMapOvr>
-    <a:masterClrMapping/>
-  </p:clrMapOvr>
-</p:notes>
-</file>
-
-<file path=ppt/notesSlides/notesSlide11.xml><?xml version="1.0" encoding="utf-8"?>
-<p:notes xmlns:a="http://schemas.openxmlformats.org/drawingml/2006/main" xmlns:r="http://schemas.openxmlformats.org/officeDocument/2006/relationships" xmlns:p="http://schemas.openxmlformats.org/presentationml/2006/main" showMasterSp="0" showMasterPhAnim="0">
-  <p:cSld>
-    <p:spTree>
-      <p:nvGrpSpPr>
         <p:cNvPr id="1" name="Shape 189"/>
         <p:cNvGrpSpPr/>
         <p:nvPr/>
@@ -1791,7 +1686,7 @@
   <p:cSld>
     <p:spTree>
       <p:nvGrpSpPr>
-        <p:cNvPr id="1" name="Shape 177"/>
+        <p:cNvPr id="1" name="Shape 183"/>
         <p:cNvGrpSpPr/>
         <p:nvPr/>
       </p:nvGrpSpPr>
@@ -1805,7 +1700,7 @@
       </p:grpSpPr>
       <p:sp>
         <p:nvSpPr>
-          <p:cNvPr id="178" name="Google Shape;178;gd6493ab6d3_0_56:notes"/>
+          <p:cNvPr id="184" name="Google Shape;184;gd6493ab6d3_0_32:notes"/>
           <p:cNvSpPr>
             <a:spLocks noGrp="1" noRot="1" noChangeAspect="1"/>
           </p:cNvSpPr>
@@ -1846,7 +1741,7 @@
       </p:sp>
       <p:sp>
         <p:nvSpPr>
-          <p:cNvPr id="179" name="Google Shape;179;gd6493ab6d3_0_56:notes"/>
+          <p:cNvPr id="185" name="Google Shape;185;gd6493ab6d3_0_32:notes"/>
           <p:cNvSpPr txBox="1">
             <a:spLocks noGrp="1"/>
           </p:cNvSpPr>
@@ -10083,197 +9978,6 @@
   <p:cSld>
     <p:spTree>
       <p:nvGrpSpPr>
-        <p:cNvPr id="1" name="Shape 186"/>
-        <p:cNvGrpSpPr/>
-        <p:nvPr/>
-      </p:nvGrpSpPr>
-      <p:grpSpPr>
-        <a:xfrm>
-          <a:off x="0" y="0"/>
-          <a:ext cx="0" cy="0"/>
-          <a:chOff x="0" y="0"/>
-          <a:chExt cx="0" cy="0"/>
-        </a:xfrm>
-      </p:grpSpPr>
-      <p:sp>
-        <p:nvSpPr>
-          <p:cNvPr id="187" name="Google Shape;187;p22"/>
-          <p:cNvSpPr txBox="1">
-            <a:spLocks noGrp="1"/>
-          </p:cNvSpPr>
-          <p:nvPr>
-            <p:ph type="title"/>
-          </p:nvPr>
-        </p:nvSpPr>
-        <p:spPr>
-          <a:xfrm>
-            <a:off x="1297500" y="393750"/>
-            <a:ext cx="7038900" cy="914100"/>
-          </a:xfrm>
-          <a:prstGeom prst="rect">
-            <a:avLst/>
-          </a:prstGeom>
-        </p:spPr>
-        <p:txBody>
-          <a:bodyPr spcFirstLastPara="1" wrap="square" lIns="91425" tIns="91425" rIns="91425" bIns="91425" anchor="t" anchorCtr="0">
-            <a:noAutofit/>
-          </a:bodyPr>
-          <a:lstStyle/>
-          <a:p>
-            <a:pPr marL="0" lvl="0" indent="0" algn="l" rtl="0">
-              <a:spcBef>
-                <a:spcPts val="0"/>
-              </a:spcBef>
-              <a:spcAft>
-                <a:spcPts val="0"/>
-              </a:spcAft>
-              <a:buNone/>
-            </a:pPr>
-            <a:r>
-              <a:rPr lang="en"/>
-              <a:t>Result and Analysis</a:t>
-            </a:r>
-            <a:endParaRPr/>
-          </a:p>
-        </p:txBody>
-      </p:sp>
-      <p:sp>
-        <p:nvSpPr>
-          <p:cNvPr id="188" name="Google Shape;188;p22"/>
-          <p:cNvSpPr txBox="1">
-            <a:spLocks noGrp="1"/>
-          </p:cNvSpPr>
-          <p:nvPr>
-            <p:ph type="body" idx="1"/>
-          </p:nvPr>
-        </p:nvSpPr>
-        <p:spPr>
-          <a:xfrm>
-            <a:off x="1297500" y="1567550"/>
-            <a:ext cx="7038900" cy="2911200"/>
-          </a:xfrm>
-          <a:prstGeom prst="rect">
-            <a:avLst/>
-          </a:prstGeom>
-        </p:spPr>
-        <p:txBody>
-          <a:bodyPr spcFirstLastPara="1" wrap="square" lIns="91425" tIns="91425" rIns="91425" bIns="91425" anchor="t" anchorCtr="0">
-            <a:noAutofit/>
-          </a:bodyPr>
-          <a:lstStyle/>
-          <a:p>
-            <a:pPr marL="457200" marR="787400" lvl="0" indent="-304800" algn="just" rtl="0">
-              <a:lnSpc>
-                <a:spcPct val="159782"/>
-              </a:lnSpc>
-              <a:spcBef>
-                <a:spcPts val="1000"/>
-              </a:spcBef>
-              <a:spcAft>
-                <a:spcPts val="0"/>
-              </a:spcAft>
-              <a:buSzPts val="1200"/>
-              <a:buChar char="●"/>
-            </a:pPr>
-            <a:r>
-              <a:rPr lang="en" sz="1200"/>
-              <a:t>Connecture, thus can significantly enhance the total experience with which peers interact with each other and to improve help with the tech culture of a college.</a:t>
-            </a:r>
-            <a:endParaRPr sz="1200"/>
-          </a:p>
-          <a:p>
-            <a:pPr marL="457200" marR="787400" lvl="0" indent="-304800" algn="just" rtl="0">
-              <a:lnSpc>
-                <a:spcPct val="159782"/>
-              </a:lnSpc>
-              <a:spcBef>
-                <a:spcPts val="0"/>
-              </a:spcBef>
-              <a:spcAft>
-                <a:spcPts val="0"/>
-              </a:spcAft>
-              <a:buSzPts val="1200"/>
-              <a:buChar char="●"/>
-            </a:pPr>
-            <a:r>
-              <a:rPr lang="en" sz="1200"/>
-              <a:t> The best part about such a system is that it is completely immune to a situation similar to the current pandemic. </a:t>
-            </a:r>
-            <a:endParaRPr sz="1200"/>
-          </a:p>
-          <a:p>
-            <a:pPr marL="457200" marR="787400" lvl="0" indent="-304800" algn="just" rtl="0">
-              <a:lnSpc>
-                <a:spcPct val="159782"/>
-              </a:lnSpc>
-              <a:spcBef>
-                <a:spcPts val="0"/>
-              </a:spcBef>
-              <a:spcAft>
-                <a:spcPts val="0"/>
-              </a:spcAft>
-              <a:buSzPts val="1200"/>
-              <a:buChar char="●"/>
-            </a:pPr>
-            <a:r>
-              <a:rPr lang="en" sz="1200"/>
-              <a:t>Connecture can have a strong impact on the learning and development of a student with the help of his peers and help him find his passion and  excel in his field with making and build and maintaining a strong tech culture supported by healthy connections.</a:t>
-            </a:r>
-            <a:endParaRPr sz="1200"/>
-          </a:p>
-          <a:p>
-            <a:pPr marL="0" lvl="0" indent="0" algn="just" rtl="0">
-              <a:spcBef>
-                <a:spcPts val="2400"/>
-              </a:spcBef>
-              <a:spcAft>
-                <a:spcPts val="0"/>
-              </a:spcAft>
-              <a:buNone/>
-            </a:pPr>
-            <a:r>
-              <a:rPr lang="en" sz="2450" b="1">
-                <a:latin typeface="Georgia"/>
-                <a:ea typeface="Georgia"/>
-                <a:cs typeface="Georgia"/>
-                <a:sym typeface="Georgia"/>
-              </a:rPr>
-              <a:t> </a:t>
-            </a:r>
-            <a:endParaRPr sz="2450" b="1">
-              <a:latin typeface="Georgia"/>
-              <a:ea typeface="Georgia"/>
-              <a:cs typeface="Georgia"/>
-              <a:sym typeface="Georgia"/>
-            </a:endParaRPr>
-          </a:p>
-          <a:p>
-            <a:pPr marL="0" lvl="0" indent="0" algn="l" rtl="0">
-              <a:spcBef>
-                <a:spcPts val="600"/>
-              </a:spcBef>
-              <a:spcAft>
-                <a:spcPts val="1600"/>
-              </a:spcAft>
-              <a:buNone/>
-            </a:pPr>
-            <a:endParaRPr/>
-          </a:p>
-        </p:txBody>
-      </p:sp>
-    </p:spTree>
-  </p:cSld>
-  <p:clrMapOvr>
-    <a:masterClrMapping/>
-  </p:clrMapOvr>
-</p:sld>
-</file>
-
-<file path=ppt/slides/slide11.xml><?xml version="1.0" encoding="utf-8"?>
-<p:sld xmlns:a="http://schemas.openxmlformats.org/drawingml/2006/main" xmlns:r="http://schemas.openxmlformats.org/officeDocument/2006/relationships" xmlns:p="http://schemas.openxmlformats.org/presentationml/2006/main">
-  <p:cSld>
-    <p:spTree>
-      <p:nvGrpSpPr>
         <p:cNvPr id="1" name="Shape 192"/>
         <p:cNvGrpSpPr/>
         <p:nvPr/>
@@ -10355,7 +10059,7 @@
           <a:p>
             <a:pPr marL="457200" marR="876300" lvl="0" indent="-304800" algn="just" rtl="0">
               <a:lnSpc>
-                <a:spcPct val="159782"/>
+                <a:spcPct val="150000"/>
               </a:lnSpc>
               <a:spcBef>
                 <a:spcPts val="1000"/>
@@ -10367,18 +10071,33 @@
               <a:buChar char="●"/>
             </a:pPr>
             <a:r>
-              <a:rPr lang="en" sz="1200"/>
-              <a:t>In this model, a major drawback is that students cannot directly connect with each other via Connecture, but only through other contact details provided by the user. One possible solution for that would be to introduce chats.  This would make it easier and faster to connect with students on Connecture.  </a:t>
+              <a:rPr lang="en" sz="1200" dirty="0"/>
+              <a:t>In this model, a major drawback is that students cannot directly connect with each other via </a:t>
             </a:r>
-            <a:endParaRPr sz="1200"/>
+            <a:r>
+              <a:rPr lang="en" sz="1200" dirty="0" err="1"/>
+              <a:t>Connecture</a:t>
+            </a:r>
+            <a:r>
+              <a:rPr lang="en" sz="1200" dirty="0"/>
+              <a:t>, but only through other contact details provided by the user. One possible solution for that would be to introduce chats.  This would make it easier and faster to connect with students on </a:t>
+            </a:r>
+            <a:r>
+              <a:rPr lang="en" sz="1200" dirty="0" err="1"/>
+              <a:t>Connecture</a:t>
+            </a:r>
+            <a:r>
+              <a:rPr lang="en" sz="1200" dirty="0"/>
+              <a:t>. </a:t>
+            </a:r>
           </a:p>
           <a:p>
             <a:pPr marL="457200" marR="876300" lvl="0" indent="-304800" algn="just" rtl="0">
               <a:lnSpc>
-                <a:spcPct val="159782"/>
+                <a:spcPct val="150000"/>
               </a:lnSpc>
               <a:spcBef>
-                <a:spcPts val="0"/>
+                <a:spcPts val="1000"/>
               </a:spcBef>
               <a:spcAft>
                 <a:spcPts val="0"/>
@@ -10387,10 +10106,37 @@
               <a:buChar char="●"/>
             </a:pPr>
             <a:r>
-              <a:rPr lang="en" sz="1200"/>
+              <a:rPr lang="en" sz="1200" dirty="0"/>
+              <a:t>The functionality of posts can make </a:t>
+            </a:r>
+            <a:r>
+              <a:rPr lang="en" sz="1200" dirty="0" err="1"/>
+              <a:t>Connecture</a:t>
+            </a:r>
+            <a:r>
+              <a:rPr lang="en" sz="1200" dirty="0"/>
+              <a:t> a lot more interactive and fun to use.</a:t>
+            </a:r>
+          </a:p>
+          <a:p>
+            <a:pPr marL="457200" marR="876300" lvl="0" indent="-304800" algn="just" rtl="0">
+              <a:lnSpc>
+                <a:spcPct val="150000"/>
+              </a:lnSpc>
+              <a:spcBef>
+                <a:spcPts val="1000"/>
+              </a:spcBef>
+              <a:spcAft>
+                <a:spcPts val="0"/>
+              </a:spcAft>
+              <a:buSzPts val="1200"/>
+              <a:buChar char="●"/>
+            </a:pPr>
+            <a:r>
+              <a:rPr lang="en" sz="1200" dirty="0"/>
               <a:t>Notifications are another scope of improvement. If someone tries to interact with a user’s posts, then he or she might actually get a notification about the same. </a:t>
             </a:r>
-            <a:endParaRPr sz="1200"/>
+            <a:endParaRPr sz="1200" dirty="0"/>
           </a:p>
           <a:p>
             <a:pPr marL="0" marR="876300" lvl="0" indent="0" algn="just" rtl="0">
@@ -10405,7 +10151,7 @@
               </a:spcAft>
               <a:buNone/>
             </a:pPr>
-            <a:endParaRPr sz="1200"/>
+            <a:endParaRPr sz="1200" dirty="0"/>
           </a:p>
           <a:p>
             <a:pPr marL="0" marR="876300" lvl="0" indent="0" algn="just" rtl="0">
@@ -10421,10 +10167,10 @@
               <a:buNone/>
             </a:pPr>
             <a:r>
-              <a:rPr lang="en" sz="1200"/>
+              <a:rPr lang="en" sz="1200" dirty="0"/>
               <a:t> </a:t>
             </a:r>
-            <a:endParaRPr sz="1200"/>
+            <a:endParaRPr sz="1200" dirty="0"/>
           </a:p>
           <a:p>
             <a:pPr marL="0" marR="876300" lvl="0" indent="0" algn="just" rtl="0">
@@ -10440,10 +10186,10 @@
               <a:buNone/>
             </a:pPr>
             <a:r>
-              <a:rPr lang="en" sz="1200"/>
+              <a:rPr lang="en" sz="1200" dirty="0"/>
               <a:t> </a:t>
             </a:r>
-            <a:endParaRPr sz="1200"/>
+            <a:endParaRPr sz="1200" dirty="0"/>
           </a:p>
           <a:p>
             <a:pPr marL="0" lvl="0" indent="0" algn="l" rtl="0">
@@ -10455,7 +10201,7 @@
               </a:spcAft>
               <a:buNone/>
             </a:pPr>
-            <a:endParaRPr/>
+            <a:endParaRPr dirty="0"/>
           </a:p>
         </p:txBody>
       </p:sp>
@@ -11550,7 +11296,7 @@
   <p:cSld>
     <p:spTree>
       <p:nvGrpSpPr>
-        <p:cNvPr id="1" name="Shape 180"/>
+        <p:cNvPr id="1" name="Shape 186"/>
         <p:cNvGrpSpPr/>
         <p:nvPr/>
       </p:nvGrpSpPr>
@@ -11564,7 +11310,7 @@
       </p:grpSpPr>
       <p:sp>
         <p:nvSpPr>
-          <p:cNvPr id="181" name="Google Shape;181;p21"/>
+          <p:cNvPr id="187" name="Google Shape;187;p22"/>
           <p:cNvSpPr txBox="1">
             <a:spLocks noGrp="1"/>
           </p:cNvSpPr>
@@ -11598,7 +11344,7 @@
             </a:pPr>
             <a:r>
               <a:rPr lang="en"/>
-              <a:t>Posts</a:t>
+              <a:t>Result and Analysis</a:t>
             </a:r>
             <a:endParaRPr/>
           </a:p>
@@ -11606,7 +11352,7 @@
       </p:sp>
       <p:sp>
         <p:nvSpPr>
-          <p:cNvPr id="182" name="Google Shape;182;p21"/>
+          <p:cNvPr id="188" name="Google Shape;188;p22"/>
           <p:cNvSpPr txBox="1">
             <a:spLocks noGrp="1"/>
           </p:cNvSpPr>
@@ -11629,12 +11375,12 @@
           </a:bodyPr>
           <a:lstStyle/>
           <a:p>
-            <a:pPr marL="457200" marR="698500" lvl="0" indent="-304800" algn="l" rtl="0">
+            <a:pPr marL="457200" marR="787400" lvl="0" indent="-304800" algn="just" rtl="0">
               <a:lnSpc>
-                <a:spcPct val="189608"/>
+                <a:spcPct val="159782"/>
               </a:lnSpc>
               <a:spcBef>
-                <a:spcPts val="100"/>
+                <a:spcPts val="1000"/>
               </a:spcBef>
               <a:spcAft>
                 <a:spcPts val="0"/>
@@ -11644,14 +11390,14 @@
             </a:pPr>
             <a:r>
               <a:rPr lang="en" sz="1200"/>
-              <a:t>Posts, are implemented as react forms on Connecture. </a:t>
+              <a:t>Connecture, thus can significantly enhance the total experience with which peers interact with each other and to improve help with the tech culture of a college.</a:t>
             </a:r>
             <a:endParaRPr sz="1200"/>
           </a:p>
           <a:p>
-            <a:pPr marL="457200" marR="698500" lvl="0" indent="-304800" algn="l" rtl="0">
+            <a:pPr marL="457200" marR="787400" lvl="0" indent="-304800" algn="just" rtl="0">
               <a:lnSpc>
-                <a:spcPct val="189608"/>
+                <a:spcPct val="159782"/>
               </a:lnSpc>
               <a:spcBef>
                 <a:spcPts val="0"/>
@@ -11664,14 +11410,14 @@
             </a:pPr>
             <a:r>
               <a:rPr lang="en" sz="1200"/>
-              <a:t>Any user can make a post and publish it on Connecture.  Connecture doesn’t have the “followers and following” system which enhances the experience of making connection as all the members can view all the posts made by any user. </a:t>
+              <a:t> The best part about such a system is that it is completely immune to a situation similar to the current pandemic. </a:t>
             </a:r>
             <a:endParaRPr sz="1200"/>
           </a:p>
           <a:p>
-            <a:pPr marL="457200" marR="698500" lvl="0" indent="-304800" algn="l" rtl="0">
+            <a:pPr marL="457200" marR="787400" lvl="0" indent="-304800" algn="just" rtl="0">
               <a:lnSpc>
-                <a:spcPct val="189608"/>
+                <a:spcPct val="159782"/>
               </a:lnSpc>
               <a:spcBef>
                 <a:spcPts val="0"/>
@@ -11684,49 +11430,40 @@
             </a:pPr>
             <a:r>
               <a:rPr lang="en" sz="1200"/>
-              <a:t>A user can add an image or text when he or she makes a post. </a:t>
+              <a:t>Connecture can have a strong impact on the learning and development of a student with the help of his peers and help him find his passion and  excel in his field with making and build and maintaining a strong tech culture supported by healthy connections.</a:t>
             </a:r>
             <a:endParaRPr sz="1200"/>
           </a:p>
           <a:p>
-            <a:pPr marL="457200" marR="698500" lvl="0" indent="-304800" algn="l" rtl="0">
-              <a:lnSpc>
-                <a:spcPct val="189608"/>
-              </a:lnSpc>
-              <a:spcBef>
-                <a:spcPts val="0"/>
-              </a:spcBef>
-              <a:spcAft>
-                <a:spcPts val="0"/>
-              </a:spcAft>
-              <a:buSzPts val="1200"/>
-              <a:buChar char="●"/>
+            <a:pPr marL="0" lvl="0" indent="0" algn="just" rtl="0">
+              <a:spcBef>
+                <a:spcPts val="2400"/>
+              </a:spcBef>
+              <a:spcAft>
+                <a:spcPts val="0"/>
+              </a:spcAft>
+              <a:buNone/>
             </a:pPr>
             <a:r>
-              <a:rPr lang="en" sz="1200"/>
-              <a:t>A  post can be liked and commented by any user of Connecture.</a:t>
+              <a:rPr lang="en" sz="2450" b="1">
+                <a:latin typeface="Georgia"/>
+                <a:ea typeface="Georgia"/>
+                <a:cs typeface="Georgia"/>
+                <a:sym typeface="Georgia"/>
+              </a:rPr>
+              <a:t> </a:t>
             </a:r>
-            <a:endParaRPr sz="1200"/>
-          </a:p>
-          <a:p>
-            <a:pPr marL="0" marR="698500" lvl="0" indent="0" algn="l" rtl="0">
-              <a:lnSpc>
-                <a:spcPct val="189608"/>
-              </a:lnSpc>
-              <a:spcBef>
-                <a:spcPts val="100"/>
-              </a:spcBef>
-              <a:spcAft>
-                <a:spcPts val="0"/>
-              </a:spcAft>
-              <a:buNone/>
-            </a:pPr>
-            <a:endParaRPr sz="1200"/>
+            <a:endParaRPr sz="2450" b="1">
+              <a:latin typeface="Georgia"/>
+              <a:ea typeface="Georgia"/>
+              <a:cs typeface="Georgia"/>
+              <a:sym typeface="Georgia"/>
+            </a:endParaRPr>
           </a:p>
           <a:p>
             <a:pPr marL="0" lvl="0" indent="0" algn="l" rtl="0">
               <a:spcBef>
-                <a:spcPts val="0"/>
+                <a:spcPts val="600"/>
               </a:spcBef>
               <a:spcAft>
                 <a:spcPts val="1600"/>

</xml_diff>